<commit_message>
Actualizo presentación de plan de mejora
</commit_message>
<xml_diff>
--- a/propuesta/Presentacion_PlanMejora_TI_Empresa.pptx
+++ b/propuesta/Presentacion_PlanMejora_TI_Empresa.pptx
@@ -3364,18 +3364,10 @@
           <a:bodyPr/>
           <a:lstStyle/>
           <a:p>
-            <a:pPr algn="l"/>
-            <a:r>
-              <a:rPr lang="es-CO" sz="2000" noProof="0" dirty="0">
-                <a:solidFill>
-                  <a:srgbClr val="323232"/>
-                </a:solidFill>
-                <a:latin typeface="Calibri"/>
-              </a:rPr>
-              <a:t>Actual Mente los procedimientos de soporte y mantenimiento se realizan de manera empírica o dispersa.</a:t>
-            </a:r>
-          </a:p>
-          <a:p>
+            <a:r>
+              <a:rPr lang="es-ES" sz="2000" dirty="0"/>
+              <a:t>Hoy en día los procedimientos de soporte y mantenimiento se ejecutan, pero no se encuentran documentados ni estandarizados en un único sistema.</a:t>
+            </a:r>
             <a:endParaRPr lang="es-CO" sz="2000" noProof="0" dirty="0">
               <a:solidFill>
                 <a:srgbClr val="323232"/>

</xml_diff>